<commit_message>
Alteração de cor do arquivo de exercicio
</commit_message>
<xml_diff>
--- a/PastaDocsProjeto/Qualidade/FIAP-QualidProjSW-Aula-4-AdministracaoConteudo- EXERCICIOS.pptx
+++ b/PastaDocsProjeto/Qualidade/FIAP-QualidProjSW-Aula-4-AdministracaoConteudo- EXERCICIOS.pptx
@@ -210,7 +210,7 @@
           <a:p>
             <a:fld id="{B6D4C934-FEA0-426E-B081-61FE807EA637}" type="datetimeFigureOut">
               <a:rPr lang="pt-BR" smtClean="0"/>
-              <a:t>27/01/2023</a:t>
+              <a:t>07/03/2024</a:t>
             </a:fld>
             <a:endParaRPr lang="pt-BR"/>
           </a:p>
@@ -368,7 +368,7 @@
           <a:p>
             <a:fld id="{F69DE88B-C5FB-4190-8CD8-D803F1201C56}" type="slidenum">
               <a:rPr lang="pt-BR" smtClean="0"/>
-              <a:t>‹nº›</a:t>
+              <a:t>‹#›</a:t>
             </a:fld>
             <a:endParaRPr lang="pt-BR"/>
           </a:p>
@@ -1052,7 +1052,7 @@
           <a:p>
             <a:fld id="{89C4B140-6DEB-45EB-A5FE-2FE213A19AB6}" type="datetimeFigureOut">
               <a:rPr lang="pt-BR" smtClean="0"/>
-              <a:t>27/01/2023</a:t>
+              <a:t>07/03/2024</a:t>
             </a:fld>
             <a:endParaRPr lang="pt-BR"/>
           </a:p>
@@ -1110,7 +1110,7 @@
           <a:p>
             <a:fld id="{1BC5D9AF-0A3A-46C6-9823-3468E6F7B9BB}" type="slidenum">
               <a:rPr lang="pt-BR" smtClean="0"/>
-              <a:t>‹nº›</a:t>
+              <a:t>‹#›</a:t>
             </a:fld>
             <a:endParaRPr lang="pt-BR"/>
           </a:p>
@@ -1260,7 +1260,7 @@
           <a:p>
             <a:fld id="{89C4B140-6DEB-45EB-A5FE-2FE213A19AB6}" type="datetimeFigureOut">
               <a:rPr lang="pt-BR" smtClean="0"/>
-              <a:t>27/01/2023</a:t>
+              <a:t>07/03/2024</a:t>
             </a:fld>
             <a:endParaRPr lang="pt-BR"/>
           </a:p>
@@ -1318,7 +1318,7 @@
           <a:p>
             <a:fld id="{1BC5D9AF-0A3A-46C6-9823-3468E6F7B9BB}" type="slidenum">
               <a:rPr lang="pt-BR" smtClean="0"/>
-              <a:t>‹nº›</a:t>
+              <a:t>‹#›</a:t>
             </a:fld>
             <a:endParaRPr lang="pt-BR"/>
           </a:p>
@@ -1468,7 +1468,7 @@
           <a:p>
             <a:fld id="{89C4B140-6DEB-45EB-A5FE-2FE213A19AB6}" type="datetimeFigureOut">
               <a:rPr lang="pt-BR" smtClean="0"/>
-              <a:t>27/01/2023</a:t>
+              <a:t>07/03/2024</a:t>
             </a:fld>
             <a:endParaRPr lang="pt-BR"/>
           </a:p>
@@ -1526,7 +1526,7 @@
           <a:p>
             <a:fld id="{1BC5D9AF-0A3A-46C6-9823-3468E6F7B9BB}" type="slidenum">
               <a:rPr lang="pt-BR" smtClean="0"/>
-              <a:t>‹nº›</a:t>
+              <a:t>‹#›</a:t>
             </a:fld>
             <a:endParaRPr lang="pt-BR"/>
           </a:p>
@@ -1724,7 +1724,7 @@
               <a:pPr>
                 <a:defRPr/>
               </a:pPr>
-              <a:t>‹nº›</a:t>
+              <a:t>‹#›</a:t>
             </a:fld>
             <a:endParaRPr lang="pt-BR"/>
           </a:p>
@@ -1874,7 +1874,7 @@
           <a:p>
             <a:fld id="{89C4B140-6DEB-45EB-A5FE-2FE213A19AB6}" type="datetimeFigureOut">
               <a:rPr lang="pt-BR" smtClean="0"/>
-              <a:t>27/01/2023</a:t>
+              <a:t>07/03/2024</a:t>
             </a:fld>
             <a:endParaRPr lang="pt-BR"/>
           </a:p>
@@ -1932,7 +1932,7 @@
           <a:p>
             <a:fld id="{1BC5D9AF-0A3A-46C6-9823-3468E6F7B9BB}" type="slidenum">
               <a:rPr lang="pt-BR" smtClean="0"/>
-              <a:t>‹nº›</a:t>
+              <a:t>‹#›</a:t>
             </a:fld>
             <a:endParaRPr lang="pt-BR"/>
           </a:p>
@@ -2149,7 +2149,7 @@
           <a:p>
             <a:fld id="{89C4B140-6DEB-45EB-A5FE-2FE213A19AB6}" type="datetimeFigureOut">
               <a:rPr lang="pt-BR" smtClean="0"/>
-              <a:t>27/01/2023</a:t>
+              <a:t>07/03/2024</a:t>
             </a:fld>
             <a:endParaRPr lang="pt-BR"/>
           </a:p>
@@ -2207,7 +2207,7 @@
           <a:p>
             <a:fld id="{1BC5D9AF-0A3A-46C6-9823-3468E6F7B9BB}" type="slidenum">
               <a:rPr lang="pt-BR" smtClean="0"/>
-              <a:t>‹nº›</a:t>
+              <a:t>‹#›</a:t>
             </a:fld>
             <a:endParaRPr lang="pt-BR"/>
           </a:p>
@@ -2472,7 +2472,7 @@
           <a:p>
             <a:fld id="{89C4B140-6DEB-45EB-A5FE-2FE213A19AB6}" type="datetimeFigureOut">
               <a:rPr lang="pt-BR" smtClean="0"/>
-              <a:t>27/01/2023</a:t>
+              <a:t>07/03/2024</a:t>
             </a:fld>
             <a:endParaRPr lang="pt-BR"/>
           </a:p>
@@ -2530,7 +2530,7 @@
           <a:p>
             <a:fld id="{1BC5D9AF-0A3A-46C6-9823-3468E6F7B9BB}" type="slidenum">
               <a:rPr lang="pt-BR" smtClean="0"/>
-              <a:t>‹nº›</a:t>
+              <a:t>‹#›</a:t>
             </a:fld>
             <a:endParaRPr lang="pt-BR"/>
           </a:p>
@@ -2935,7 +2935,7 @@
           <a:p>
             <a:fld id="{89C4B140-6DEB-45EB-A5FE-2FE213A19AB6}" type="datetimeFigureOut">
               <a:rPr lang="pt-BR" smtClean="0"/>
-              <a:t>27/01/2023</a:t>
+              <a:t>07/03/2024</a:t>
             </a:fld>
             <a:endParaRPr lang="pt-BR"/>
           </a:p>
@@ -2993,7 +2993,7 @@
           <a:p>
             <a:fld id="{1BC5D9AF-0A3A-46C6-9823-3468E6F7B9BB}" type="slidenum">
               <a:rPr lang="pt-BR" smtClean="0"/>
-              <a:t>‹nº›</a:t>
+              <a:t>‹#›</a:t>
             </a:fld>
             <a:endParaRPr lang="pt-BR"/>
           </a:p>
@@ -3084,7 +3084,7 @@
           <a:p>
             <a:fld id="{89C4B140-6DEB-45EB-A5FE-2FE213A19AB6}" type="datetimeFigureOut">
               <a:rPr lang="pt-BR" smtClean="0"/>
-              <a:t>27/01/2023</a:t>
+              <a:t>07/03/2024</a:t>
             </a:fld>
             <a:endParaRPr lang="pt-BR"/>
           </a:p>
@@ -3142,7 +3142,7 @@
           <a:p>
             <a:fld id="{1BC5D9AF-0A3A-46C6-9823-3468E6F7B9BB}" type="slidenum">
               <a:rPr lang="pt-BR" smtClean="0"/>
-              <a:t>‹nº›</a:t>
+              <a:t>‹#›</a:t>
             </a:fld>
             <a:endParaRPr lang="pt-BR"/>
           </a:p>
@@ -3203,7 +3203,7 @@
           <a:p>
             <a:fld id="{89C4B140-6DEB-45EB-A5FE-2FE213A19AB6}" type="datetimeFigureOut">
               <a:rPr lang="pt-BR" smtClean="0"/>
-              <a:t>27/01/2023</a:t>
+              <a:t>07/03/2024</a:t>
             </a:fld>
             <a:endParaRPr lang="pt-BR"/>
           </a:p>
@@ -3261,7 +3261,7 @@
           <a:p>
             <a:fld id="{1BC5D9AF-0A3A-46C6-9823-3468E6F7B9BB}" type="slidenum">
               <a:rPr lang="pt-BR" smtClean="0"/>
-              <a:t>‹nº›</a:t>
+              <a:t>‹#›</a:t>
             </a:fld>
             <a:endParaRPr lang="pt-BR"/>
           </a:p>
@@ -3511,7 +3511,7 @@
           <a:p>
             <a:fld id="{89C4B140-6DEB-45EB-A5FE-2FE213A19AB6}" type="datetimeFigureOut">
               <a:rPr lang="pt-BR" smtClean="0"/>
-              <a:t>27/01/2023</a:t>
+              <a:t>07/03/2024</a:t>
             </a:fld>
             <a:endParaRPr lang="pt-BR"/>
           </a:p>
@@ -3569,7 +3569,7 @@
           <a:p>
             <a:fld id="{1BC5D9AF-0A3A-46C6-9823-3468E6F7B9BB}" type="slidenum">
               <a:rPr lang="pt-BR" smtClean="0"/>
-              <a:t>‹nº›</a:t>
+              <a:t>‹#›</a:t>
             </a:fld>
             <a:endParaRPr lang="pt-BR"/>
           </a:p>
@@ -3796,7 +3796,7 @@
           <a:p>
             <a:fld id="{89C4B140-6DEB-45EB-A5FE-2FE213A19AB6}" type="datetimeFigureOut">
               <a:rPr lang="pt-BR" smtClean="0"/>
-              <a:t>27/01/2023</a:t>
+              <a:t>07/03/2024</a:t>
             </a:fld>
             <a:endParaRPr lang="pt-BR"/>
           </a:p>
@@ -3854,7 +3854,7 @@
           <a:p>
             <a:fld id="{1BC5D9AF-0A3A-46C6-9823-3468E6F7B9BB}" type="slidenum">
               <a:rPr lang="pt-BR" smtClean="0"/>
-              <a:t>‹nº›</a:t>
+              <a:t>‹#›</a:t>
             </a:fld>
             <a:endParaRPr lang="pt-BR"/>
           </a:p>
@@ -4447,12 +4447,18 @@
                 <a:solidFill>
                   <a:srgbClr val="FF0000"/>
                 </a:solidFill>
+                <a:highlight>
+                  <a:srgbClr val="FFFF00"/>
+                </a:highlight>
                 <a:latin typeface="Calibri" panose="020F0502020204030204" pitchFamily="34" charset="0"/>
               </a:rPr>
               <a:t>Lista de exercícios e atividades complementares - </a:t>
             </a:r>
             <a:r>
               <a:rPr lang="pt-BR" sz="1800" dirty="0">
+                <a:highlight>
+                  <a:srgbClr val="FFFF00"/>
+                </a:highlight>
                 <a:latin typeface="Calibri" panose="020F0502020204030204" pitchFamily="34" charset="0"/>
               </a:rPr>
               <a:t>AULA: </a:t>
@@ -4461,17 +4467,26 @@
           <a:p>
             <a:r>
               <a:rPr lang="pt-BR" b="1" dirty="0">
+                <a:highlight>
+                  <a:srgbClr val="FFFF00"/>
+                </a:highlight>
                 <a:latin typeface="Calibri" panose="020F0502020204030204" pitchFamily="34" charset="0"/>
               </a:rPr>
               <a:t>4 </a:t>
             </a:r>
             <a:r>
-              <a:rPr lang="pt-BR" sz="1800" b="1">
+              <a:rPr lang="pt-BR" sz="1800" b="1" dirty="0">
+                <a:highlight>
+                  <a:srgbClr val="FFFF00"/>
+                </a:highlight>
                 <a:latin typeface="Calibri" panose="020F0502020204030204" pitchFamily="34" charset="0"/>
               </a:rPr>
               <a:t>– GERENCIAMENTO DO CONTEÚDO SOBRE REGRAS DE TRABALHO E RESULTADOS DE PROJETOS DE SOFTWARE</a:t>
             </a:r>
             <a:endParaRPr lang="pt-BR" b="1" dirty="0">
+              <a:highlight>
+                <a:srgbClr val="FFFF00"/>
+              </a:highlight>
               <a:latin typeface="Calibri" panose="020F0502020204030204" pitchFamily="34" charset="0"/>
             </a:endParaRPr>
           </a:p>

</xml_diff>